<commit_message>
add another case - CVE-2016-4557
</commit_message>
<xml_diff>
--- a/UAF/2016/CVE-2016-4557.pptx
+++ b/UAF/2016/CVE-2016-4557.pptx
@@ -10,6 +10,8 @@
     <p:sldId id="257" r:id="rId5"/>
     <p:sldId id="259" r:id="rId6"/>
     <p:sldId id="260" r:id="rId7"/>
+    <p:sldId id="263" r:id="rId8"/>
+    <p:sldId id="262" r:id="rId9"/>
   </p:sldIdLst>
   <p:sldSz cx="12192000" cy="6858000"/>
   <p:notesSz cx="7103745" cy="10234295"/>
@@ -2646,10 +2648,10 @@
           <a:bodyPr/>
           <a:p>
             <a:r>
-              <a:rPr lang="" altLang="en-US"/>
-              <a:t>CVE ID</a:t>
-            </a:r>
-            <a:endParaRPr lang="" altLang="en-US"/>
+              <a:rPr lang="en-US" altLang="en-US"/>
+              <a:t>CVE-2016-4557</a:t>
+            </a:r>
+            <a:endParaRPr lang="en-US" altLang="en-US"/>
           </a:p>
         </p:txBody>
       </p:sp>
@@ -2704,10 +2706,10 @@
           <a:bodyPr/>
           <a:p>
             <a:r>
-              <a:rPr lang="" altLang="en-US"/>
+              <a:rPr lang="en-US" altLang="en-US"/>
               <a:t>Description</a:t>
             </a:r>
-            <a:endParaRPr lang="" altLang="en-US"/>
+            <a:endParaRPr lang="en-US" altLang="en-US"/>
           </a:p>
         </p:txBody>
       </p:sp>
@@ -2726,10 +2728,34 @@
           <a:bodyPr/>
           <a:p>
             <a:r>
-              <a:rPr lang="" altLang="en-US"/>
-              <a:t>feel free to extend if you think one page is not enough.</a:t>
-            </a:r>
-            <a:endParaRPr lang="" altLang="en-US"/>
+              <a:rPr lang="en-US" altLang="en-US"/>
+              <a:t>The </a:t>
+            </a:r>
+            <a:r>
+              <a:rPr lang="en-US" altLang="en-US">
+                <a:solidFill>
+                  <a:srgbClr val="FF0000"/>
+                </a:solidFill>
+              </a:rPr>
+              <a:t>replace_map_fd_with_map_ptr</a:t>
+            </a:r>
+            <a:r>
+              <a:rPr lang="en-US" altLang="en-US"/>
+              <a:t> function in kernel/bpf/verifier.c in the Linux kernel before 4.5.5 does not properly </a:t>
+            </a:r>
+            <a:r>
+              <a:rPr lang="en-US" altLang="en-US">
+                <a:solidFill>
+                  <a:srgbClr val="FF0000"/>
+                </a:solidFill>
+              </a:rPr>
+              <a:t>maintain an fd data structure</a:t>
+            </a:r>
+            <a:r>
+              <a:rPr lang="en-US" altLang="en-US"/>
+              <a:t>, which allows local users to gain privileges or cause a denial of service (use-after-free) via crafted BPF instructions that reference an incorrect file descriptor.</a:t>
+            </a:r>
+            <a:endParaRPr lang="en-US" altLang="en-US"/>
           </a:p>
         </p:txBody>
       </p:sp>
@@ -2766,37 +2792,327 @@
           <a:bodyPr/>
           <a:p>
             <a:r>
-              <a:rPr lang="" altLang="en-US"/>
+              <a:rPr lang="en-US" altLang="en-US"/>
               <a:t>Root Cause</a:t>
             </a:r>
-            <a:endParaRPr lang="" altLang="en-US"/>
-          </a:p>
-        </p:txBody>
-      </p:sp>
-      <p:sp>
-        <p:nvSpPr>
-          <p:cNvPr id="3" name="Content Placeholder 2"/>
-          <p:cNvSpPr>
-            <a:spLocks noGrp="1"/>
-          </p:cNvSpPr>
-          <p:nvPr>
-            <p:ph idx="1"/>
-          </p:nvPr>
-        </p:nvSpPr>
-        <p:spPr/>
-        <p:txBody>
-          <a:bodyPr/>
+            <a:endParaRPr lang="en-US" altLang="en-US"/>
+          </a:p>
+        </p:txBody>
+      </p:sp>
+      <p:pic>
+        <p:nvPicPr>
+          <p:cNvPr id="4" name="Picture 3" descr="Screenshot from 2019-01-06 10-54-43"/>
+          <p:cNvPicPr>
+            <a:picLocks noChangeAspect="1"/>
+          </p:cNvPicPr>
+          <p:nvPr/>
+        </p:nvPicPr>
+        <p:blipFill>
+          <a:blip r:embed="rId1"/>
+          <a:stretch>
+            <a:fillRect/>
+          </a:stretch>
+        </p:blipFill>
+        <p:spPr>
+          <a:xfrm>
+            <a:off x="27305" y="3252470"/>
+            <a:ext cx="5981700" cy="1123950"/>
+          </a:xfrm>
+          <a:prstGeom prst="rect">
+            <a:avLst/>
+          </a:prstGeom>
+        </p:spPr>
+      </p:pic>
+      <p:pic>
+        <p:nvPicPr>
+          <p:cNvPr id="5" name="Picture 4" descr="Screenshot from 2019-01-06 10-56-49"/>
+          <p:cNvPicPr>
+            <a:picLocks noChangeAspect="1"/>
+          </p:cNvPicPr>
+          <p:nvPr/>
+        </p:nvPicPr>
+        <p:blipFill>
+          <a:blip r:embed="rId2"/>
+          <a:stretch>
+            <a:fillRect/>
+          </a:stretch>
+        </p:blipFill>
+        <p:spPr>
+          <a:xfrm>
+            <a:off x="26035" y="2156460"/>
+            <a:ext cx="5047615" cy="742950"/>
+          </a:xfrm>
+          <a:prstGeom prst="rect">
+            <a:avLst/>
+          </a:prstGeom>
+        </p:spPr>
+      </p:pic>
+      <p:pic>
+        <p:nvPicPr>
+          <p:cNvPr id="6" name="Picture 5" descr="Screenshot from 2019-01-06 10-58-01"/>
+          <p:cNvPicPr>
+            <a:picLocks noChangeAspect="1"/>
+          </p:cNvPicPr>
+          <p:nvPr/>
+        </p:nvPicPr>
+        <p:blipFill>
+          <a:blip r:embed="rId3"/>
+          <a:stretch>
+            <a:fillRect/>
+          </a:stretch>
+        </p:blipFill>
+        <p:spPr>
+          <a:xfrm>
+            <a:off x="6071235" y="1332865"/>
+            <a:ext cx="5190490" cy="2390775"/>
+          </a:xfrm>
+          <a:prstGeom prst="rect">
+            <a:avLst/>
+          </a:prstGeom>
+        </p:spPr>
+      </p:pic>
+      <p:cxnSp>
+        <p:nvCxnSpPr>
+          <p:cNvPr id="7" name="Straight Arrow Connector 6"/>
+          <p:cNvCxnSpPr/>
+          <p:nvPr/>
+        </p:nvCxnSpPr>
+        <p:spPr>
+          <a:xfrm>
+            <a:off x="2905760" y="3992880"/>
+            <a:ext cx="1214120" cy="756920"/>
+          </a:xfrm>
+          <a:prstGeom prst="straightConnector1">
+            <a:avLst/>
+          </a:prstGeom>
+          <a:ln w="12700">
+            <a:solidFill>
+              <a:srgbClr val="FF0000"/>
+            </a:solidFill>
+            <a:tailEnd type="arrow"/>
+          </a:ln>
+        </p:spPr>
+        <p:style>
+          <a:lnRef idx="1">
+            <a:schemeClr val="accent1"/>
+          </a:lnRef>
+          <a:fillRef idx="0">
+            <a:schemeClr val="accent1"/>
+          </a:fillRef>
+          <a:effectRef idx="0">
+            <a:schemeClr val="accent1"/>
+          </a:effectRef>
+          <a:fontRef idx="minor">
+            <a:schemeClr val="tx1"/>
+          </a:fontRef>
+        </p:style>
+      </p:cxnSp>
+      <p:cxnSp>
+        <p:nvCxnSpPr>
+          <p:cNvPr id="8" name="Straight Arrow Connector 7"/>
+          <p:cNvCxnSpPr/>
+          <p:nvPr/>
+        </p:nvCxnSpPr>
+        <p:spPr>
+          <a:xfrm>
+            <a:off x="7975600" y="2804160"/>
+            <a:ext cx="5080" cy="1427480"/>
+          </a:xfrm>
+          <a:prstGeom prst="straightConnector1">
+            <a:avLst/>
+          </a:prstGeom>
+          <a:ln w="12700">
+            <a:solidFill>
+              <a:srgbClr val="FF0000"/>
+            </a:solidFill>
+            <a:tailEnd type="arrow"/>
+          </a:ln>
+        </p:spPr>
+        <p:style>
+          <a:lnRef idx="1">
+            <a:schemeClr val="accent1"/>
+          </a:lnRef>
+          <a:fillRef idx="0">
+            <a:schemeClr val="accent1"/>
+          </a:fillRef>
+          <a:effectRef idx="0">
+            <a:schemeClr val="accent1"/>
+          </a:effectRef>
+          <a:fontRef idx="minor">
+            <a:schemeClr val="tx1"/>
+          </a:fontRef>
+        </p:style>
+      </p:cxnSp>
+      <p:sp>
+        <p:nvSpPr>
+          <p:cNvPr id="9" name="Text Box 8"/>
+          <p:cNvSpPr txBox="1"/>
+          <p:nvPr/>
+        </p:nvSpPr>
+        <p:spPr>
+          <a:xfrm>
+            <a:off x="4344035" y="4376420"/>
+            <a:ext cx="7619365" cy="1753235"/>
+          </a:xfrm>
+          <a:prstGeom prst="rect">
+            <a:avLst/>
+          </a:prstGeom>
+          <a:noFill/>
+        </p:spPr>
+        <p:txBody>
+          <a:bodyPr wrap="square" rtlCol="0">
+            <a:spAutoFit/>
+          </a:bodyPr>
           <a:p>
             <a:r>
               <a:rPr lang="en-US" altLang="en-US">
-                <a:sym typeface="+mn-ea"/>
+                <a:solidFill>
+                  <a:srgbClr val="FF0000"/>
+                </a:solidFill>
               </a:rPr>
-              <a:t>feel free to extend if you think one page is not enough.</a:t>
-            </a:r>
-            <a:endParaRPr lang="en-US"/>
-          </a:p>
-        </p:txBody>
-      </p:sp>
+              <a:t>when the caller supplies a file descriptor number referring</a:t>
+            </a:r>
+            <a:endParaRPr lang="en-US" altLang="en-US">
+              <a:solidFill>
+                <a:srgbClr val="FF0000"/>
+              </a:solidFill>
+            </a:endParaRPr>
+          </a:p>
+          <a:p>
+            <a:r>
+              <a:rPr lang="en-US" altLang="en-US">
+                <a:solidFill>
+                  <a:srgbClr val="FF0000"/>
+                </a:solidFill>
+              </a:rPr>
+              <a:t>to a struct file that is not an eBPF map, both __bpf_map_get() and</a:t>
+            </a:r>
+            <a:endParaRPr lang="en-US" altLang="en-US">
+              <a:solidFill>
+                <a:srgbClr val="FF0000"/>
+              </a:solidFill>
+            </a:endParaRPr>
+          </a:p>
+          <a:p>
+            <a:r>
+              <a:rPr lang="en-US" altLang="en-US">
+                <a:solidFill>
+                  <a:srgbClr val="FF0000"/>
+                </a:solidFill>
+              </a:rPr>
+              <a:t>replace_map_fd_with_map_ptr() will call fdput() on the struct fd. If</a:t>
+            </a:r>
+            <a:endParaRPr lang="en-US" altLang="en-US">
+              <a:solidFill>
+                <a:srgbClr val="FF0000"/>
+              </a:solidFill>
+            </a:endParaRPr>
+          </a:p>
+          <a:p>
+            <a:r>
+              <a:rPr lang="en-US" altLang="en-US">
+                <a:solidFill>
+                  <a:srgbClr val="FF0000"/>
+                </a:solidFill>
+              </a:rPr>
+              <a:t>__fget_light() detected that the file descriptor table is shared with another task and therefore the FDPUT_FPUT flag is set in the struct fd, this will cause the reference count of the struct file to be over-decremented</a:t>
+            </a:r>
+            <a:endParaRPr lang="en-US" altLang="en-US">
+              <a:solidFill>
+                <a:srgbClr val="FF0000"/>
+              </a:solidFill>
+            </a:endParaRPr>
+          </a:p>
+        </p:txBody>
+      </p:sp>
+      <p:sp>
+        <p:nvSpPr>
+          <p:cNvPr id="10" name="Text Box 9"/>
+          <p:cNvSpPr txBox="1"/>
+          <p:nvPr/>
+        </p:nvSpPr>
+        <p:spPr>
+          <a:xfrm>
+            <a:off x="2454275" y="6116320"/>
+            <a:ext cx="7284085" cy="368300"/>
+          </a:xfrm>
+          <a:prstGeom prst="rect">
+            <a:avLst/>
+          </a:prstGeom>
+          <a:noFill/>
+        </p:spPr>
+        <p:txBody>
+          <a:bodyPr wrap="square" rtlCol="0">
+            <a:spAutoFit/>
+          </a:bodyPr>
+          <a:p>
+            <a:r>
+              <a:rPr lang="en-US">
+                <a:hlinkClick r:id="rId4" action="ppaction://hlinkfile"/>
+              </a:rPr>
+              <a:t>https://elixir.bootlin.com/linux/v4.5/source/kernel/bpf/verifier.c#L1987</a:t>
+            </a:r>
+            <a:endParaRPr lang="en-US"/>
+          </a:p>
+        </p:txBody>
+      </p:sp>
+      <p:pic>
+        <p:nvPicPr>
+          <p:cNvPr id="11" name="Picture 10" descr="Screenshot from 2019-01-06 16-14-27"/>
+          <p:cNvPicPr>
+            <a:picLocks noChangeAspect="1"/>
+          </p:cNvPicPr>
+          <p:nvPr/>
+        </p:nvPicPr>
+        <p:blipFill>
+          <a:blip r:embed="rId5"/>
+          <a:stretch>
+            <a:fillRect/>
+          </a:stretch>
+        </p:blipFill>
+        <p:spPr>
+          <a:xfrm>
+            <a:off x="29210" y="4897755"/>
+            <a:ext cx="3333115" cy="942975"/>
+          </a:xfrm>
+          <a:prstGeom prst="rect">
+            <a:avLst/>
+          </a:prstGeom>
+        </p:spPr>
+      </p:pic>
+      <p:cxnSp>
+        <p:nvCxnSpPr>
+          <p:cNvPr id="12" name="Straight Arrow Connector 11"/>
+          <p:cNvCxnSpPr/>
+          <p:nvPr/>
+        </p:nvCxnSpPr>
+        <p:spPr>
+          <a:xfrm flipV="1">
+            <a:off x="3571240" y="1742440"/>
+            <a:ext cx="2509520" cy="1574800"/>
+          </a:xfrm>
+          <a:prstGeom prst="straightConnector1">
+            <a:avLst/>
+          </a:prstGeom>
+          <a:ln>
+            <a:tailEnd type="arrow"/>
+          </a:ln>
+        </p:spPr>
+        <p:style>
+          <a:lnRef idx="1">
+            <a:schemeClr val="accent1"/>
+          </a:lnRef>
+          <a:fillRef idx="0">
+            <a:schemeClr val="accent1"/>
+          </a:fillRef>
+          <a:effectRef idx="0">
+            <a:schemeClr val="accent1"/>
+          </a:effectRef>
+          <a:fontRef idx="minor">
+            <a:schemeClr val="tx1"/>
+          </a:fontRef>
+        </p:style>
+      </p:cxnSp>
     </p:spTree>
   </p:cSld>
   <p:clrMapOvr>
@@ -2830,37 +3146,68 @@
           <a:bodyPr/>
           <a:p>
             <a:r>
-              <a:rPr lang="" altLang="en-US"/>
+              <a:rPr lang="en-US" altLang="en-US"/>
               <a:t>Patch</a:t>
             </a:r>
-            <a:endParaRPr lang="" altLang="en-US"/>
-          </a:p>
-        </p:txBody>
-      </p:sp>
-      <p:sp>
-        <p:nvSpPr>
-          <p:cNvPr id="3" name="Content Placeholder 2"/>
-          <p:cNvSpPr>
-            <a:spLocks noGrp="1"/>
-          </p:cNvSpPr>
-          <p:nvPr>
-            <p:ph idx="1"/>
-          </p:nvPr>
-        </p:nvSpPr>
-        <p:spPr/>
-        <p:txBody>
-          <a:bodyPr/>
-          <a:p>
-            <a:r>
-              <a:rPr lang="en-US" altLang="en-US">
-                <a:sym typeface="+mn-ea"/>
+            <a:endParaRPr lang="en-US" altLang="en-US"/>
+          </a:p>
+        </p:txBody>
+      </p:sp>
+      <p:sp>
+        <p:nvSpPr>
+          <p:cNvPr id="4" name="Text Box 3"/>
+          <p:cNvSpPr txBox="1"/>
+          <p:nvPr/>
+        </p:nvSpPr>
+        <p:spPr>
+          <a:xfrm>
+            <a:off x="1517015" y="5669280"/>
+            <a:ext cx="9157970" cy="368300"/>
+          </a:xfrm>
+          <a:prstGeom prst="rect">
+            <a:avLst/>
+          </a:prstGeom>
+          <a:noFill/>
+        </p:spPr>
+        <p:txBody>
+          <a:bodyPr wrap="square" rtlCol="0">
+            <a:spAutoFit/>
+          </a:bodyPr>
+          <a:p>
+            <a:r>
+              <a:rPr lang="en-US">
+                <a:hlinkClick r:id="rId1" action="ppaction://hlinkfile"/>
               </a:rPr>
-              <a:t>feel free to extend if you think one page is not enough.</a:t>
-            </a:r>
-            <a:endParaRPr lang="en-US"/>
-          </a:p>
-        </p:txBody>
-      </p:sp>
+              <a:t>https://github.com/torvalds/linux/commit/8358b02bf67d3a5d8a825070e1aa73f25fb2e4c7</a:t>
+            </a:r>
+            <a:endParaRPr lang="en-US"/>
+          </a:p>
+        </p:txBody>
+      </p:sp>
+      <p:pic>
+        <p:nvPicPr>
+          <p:cNvPr id="6" name="Picture 5" descr="Screenshot from 2019-01-06 17-51-21"/>
+          <p:cNvPicPr>
+            <a:picLocks noChangeAspect="1"/>
+          </p:cNvPicPr>
+          <p:nvPr/>
+        </p:nvPicPr>
+        <p:blipFill>
+          <a:blip r:embed="rId2"/>
+          <a:stretch>
+            <a:fillRect/>
+          </a:stretch>
+        </p:blipFill>
+        <p:spPr>
+          <a:xfrm>
+            <a:off x="2247265" y="2219325"/>
+            <a:ext cx="6933565" cy="2419350"/>
+          </a:xfrm>
+          <a:prstGeom prst="rect">
+            <a:avLst/>
+          </a:prstGeom>
+        </p:spPr>
+      </p:pic>
     </p:spTree>
   </p:cSld>
   <p:clrMapOvr>
@@ -2894,10 +3241,10 @@
           <a:bodyPr/>
           <a:p>
             <a:r>
-              <a:rPr lang="" altLang="en-US"/>
+              <a:rPr lang="en-US" altLang="en-US"/>
               <a:t>Patch Analysis</a:t>
             </a:r>
-            <a:endParaRPr lang="" altLang="en-US"/>
+            <a:endParaRPr lang="en-US" altLang="en-US"/>
           </a:p>
         </p:txBody>
       </p:sp>
@@ -2916,11 +3263,213 @@
           <a:bodyPr/>
           <a:p>
             <a:r>
+              <a:rPr lang="en-US" altLang="en-US"/>
+              <a:t>As when error happens, fd is already freed in the </a:t>
+            </a:r>
+            <a:r>
               <a:rPr lang="en-US" altLang="en-US">
+                <a:solidFill>
+                  <a:srgbClr val="FF0000"/>
+                </a:solidFill>
                 <a:sym typeface="+mn-ea"/>
               </a:rPr>
-              <a:t>feel free to extend if you think one page is not enough.</a:t>
-            </a:r>
+              <a:t>__bpf_map_get</a:t>
+            </a:r>
+            <a:r>
+              <a:rPr lang="en-US" altLang="en-US">
+                <a:solidFill>
+                  <a:schemeClr val="tx1"/>
+                </a:solidFill>
+                <a:sym typeface="+mn-ea"/>
+              </a:rPr>
+              <a:t>. So to directly remove</a:t>
+            </a:r>
+            <a:r>
+              <a:rPr lang="en-US" altLang="en-US">
+                <a:solidFill>
+                  <a:schemeClr val="tx1"/>
+                </a:solidFill>
+              </a:rPr>
+              <a:t> fdput in the </a:t>
+            </a:r>
+            <a:r>
+              <a:rPr lang="en-US" altLang="en-US">
+                <a:solidFill>
+                  <a:srgbClr val="FF0000"/>
+                </a:solidFill>
+                <a:sym typeface="+mn-ea"/>
+              </a:rPr>
+              <a:t>replace_map_fd_with_map_ptr</a:t>
+            </a:r>
+            <a:r>
+              <a:rPr lang="en-US" altLang="en-US">
+                <a:solidFill>
+                  <a:schemeClr val="tx1"/>
+                </a:solidFill>
+                <a:sym typeface="+mn-ea"/>
+              </a:rPr>
+              <a:t> is enough.</a:t>
+            </a:r>
+            <a:endParaRPr lang="en-US" altLang="en-US">
+              <a:solidFill>
+                <a:schemeClr val="tx1"/>
+              </a:solidFill>
+            </a:endParaRPr>
+          </a:p>
+        </p:txBody>
+      </p:sp>
+    </p:spTree>
+  </p:cSld>
+  <p:clrMapOvr>
+    <a:masterClrMapping/>
+  </p:clrMapOvr>
+</p:sld>
+</file>
+
+<file path=ppt/slides/slide6.xml><?xml version="1.0" encoding="utf-8"?>
+<p:sld xmlns:a="http://schemas.openxmlformats.org/drawingml/2006/main" xmlns:r="http://schemas.openxmlformats.org/officeDocument/2006/relationships" xmlns:p="http://schemas.openxmlformats.org/presentationml/2006/main">
+  <p:cSld>
+    <p:spTree>
+      <p:nvGrpSpPr>
+        <p:cNvPr id="1" name=""/>
+        <p:cNvGrpSpPr/>
+        <p:nvPr/>
+      </p:nvGrpSpPr>
+      <p:grpSpPr/>
+      <p:sp>
+        <p:nvSpPr>
+          <p:cNvPr id="2" name="Title 1"/>
+          <p:cNvSpPr>
+            <a:spLocks noGrp="1"/>
+          </p:cNvSpPr>
+          <p:nvPr>
+            <p:ph type="title"/>
+          </p:nvPr>
+        </p:nvSpPr>
+        <p:spPr/>
+        <p:txBody>
+          <a:bodyPr>
+            <a:normAutofit/>
+          </a:bodyPr>
+          <a:p>
+            <a:r>
+              <a:rPr lang="en-US" altLang="en-US"/>
+              <a:t>PoC/Exploit</a:t>
+            </a:r>
+            <a:endParaRPr lang="en-US" altLang="en-US"/>
+          </a:p>
+        </p:txBody>
+      </p:sp>
+      <p:sp>
+        <p:nvSpPr>
+          <p:cNvPr id="3" name="Content Placeholder 2"/>
+          <p:cNvSpPr>
+            <a:spLocks noGrp="1"/>
+          </p:cNvSpPr>
+          <p:nvPr>
+            <p:ph idx="1"/>
+          </p:nvPr>
+        </p:nvSpPr>
+        <p:spPr/>
+        <p:txBody>
+          <a:bodyPr/>
+          <a:p>
+            <a:r>
+              <a:rPr lang="en-US"/>
+              <a:t>https://www.exploit-db.com/exploits/39772</a:t>
+            </a:r>
+            <a:endParaRPr lang="en-US"/>
+          </a:p>
+          <a:p>
+            <a:r>
+              <a:rPr lang="en-US"/>
+              <a:t>https://bugs.chromium.org/p/project-zero/issues/detail?id=808</a:t>
+            </a:r>
+            <a:endParaRPr lang="en-US"/>
+          </a:p>
+          <a:p>
+            <a:endParaRPr lang="en-US"/>
+          </a:p>
+        </p:txBody>
+      </p:sp>
+    </p:spTree>
+  </p:cSld>
+  <p:clrMapOvr>
+    <a:masterClrMapping/>
+  </p:clrMapOvr>
+</p:sld>
+</file>
+
+<file path=ppt/slides/slide7.xml><?xml version="1.0" encoding="utf-8"?>
+<p:sld xmlns:a="http://schemas.openxmlformats.org/drawingml/2006/main" xmlns:r="http://schemas.openxmlformats.org/officeDocument/2006/relationships" xmlns:p="http://schemas.openxmlformats.org/presentationml/2006/main">
+  <p:cSld>
+    <p:spTree>
+      <p:nvGrpSpPr>
+        <p:cNvPr id="1" name=""/>
+        <p:cNvGrpSpPr/>
+        <p:nvPr/>
+      </p:nvGrpSpPr>
+      <p:grpSpPr/>
+      <p:sp>
+        <p:nvSpPr>
+          <p:cNvPr id="2" name="Title 1"/>
+          <p:cNvSpPr>
+            <a:spLocks noGrp="1"/>
+          </p:cNvSpPr>
+          <p:nvPr>
+            <p:ph type="title"/>
+          </p:nvPr>
+        </p:nvSpPr>
+        <p:spPr/>
+        <p:txBody>
+          <a:bodyPr>
+            <a:normAutofit/>
+          </a:bodyPr>
+          <a:p>
+            <a:r>
+              <a:rPr lang="en-US" altLang="en-US"/>
+              <a:t>References</a:t>
+            </a:r>
+            <a:endParaRPr lang="en-US" altLang="en-US"/>
+          </a:p>
+        </p:txBody>
+      </p:sp>
+      <p:sp>
+        <p:nvSpPr>
+          <p:cNvPr id="3" name="Content Placeholder 2"/>
+          <p:cNvSpPr>
+            <a:spLocks noGrp="1"/>
+          </p:cNvSpPr>
+          <p:nvPr>
+            <p:ph idx="1"/>
+          </p:nvPr>
+        </p:nvSpPr>
+        <p:spPr/>
+        <p:txBody>
+          <a:bodyPr/>
+          <a:p>
+            <a:r>
+              <a:rPr lang="en-US">
+                <a:hlinkClick r:id="rId1" action="ppaction://hlinkfile"/>
+              </a:rPr>
+              <a:t>https://nvd.nist.gov/vuln/detail/CVE-2016-4557</a:t>
+            </a:r>
+            <a:endParaRPr lang="en-US">
+              <a:hlinkClick r:id="rId1" action="ppaction://hlinkfile"/>
+            </a:endParaRPr>
+          </a:p>
+          <a:p>
+            <a:r>
+              <a:rPr lang="en-US">
+                <a:hlinkClick r:id="rId1" action="ppaction://hlinkfile"/>
+              </a:rPr>
+              <a:t>https://bugs.chromium.org/p/project-zero/issues/detail?id=808</a:t>
+            </a:r>
+            <a:endParaRPr lang="en-US">
+              <a:hlinkClick r:id="rId1" action="ppaction://hlinkfile"/>
+            </a:endParaRPr>
+          </a:p>
+          <a:p>
             <a:endParaRPr lang="en-US"/>
           </a:p>
         </p:txBody>

</xml_diff>